<commit_message>
Added homework for 05. View-Engines
</commit_message>
<xml_diff>
--- a/05. View-Engines/View-Engines.pptx
+++ b/05. View-Engines/View-Engines.pptx
@@ -5,7 +5,7 @@
     <p:sldMasterId id="2147483660" r:id="rId1"/>
   </p:sldMasterIdLst>
   <p:notesMasterIdLst>
-    <p:notesMasterId r:id="rId35"/>
+    <p:notesMasterId r:id="rId34"/>
   </p:notesMasterIdLst>
   <p:sldIdLst>
     <p:sldId id="256" r:id="rId2"/>
@@ -40,7 +40,6 @@
     <p:sldId id="283" r:id="rId31"/>
     <p:sldId id="284" r:id="rId32"/>
     <p:sldId id="285" r:id="rId33"/>
-    <p:sldId id="286" r:id="rId34"/>
   </p:sldIdLst>
   <p:sldSz cx="9144000" cy="6858000" type="screen4x3"/>
   <p:notesSz cx="6858000" cy="9144000"/>
@@ -229,7 +228,7 @@
           <a:p>
             <a:fld id="{F243D736-7DC5-4C97-A79B-788317C7EB36}" type="datetimeFigureOut">
               <a:rPr lang="en-US" smtClean="0"/>
-              <a:t>06-Oct-14</a:t>
+              <a:t>1/3/2016</a:t>
             </a:fld>
             <a:endParaRPr lang="en-US"/>
           </a:p>
@@ -21051,212 +21050,6 @@
       </p:par>
     </p:tnLst>
   </p:timing>
-</p:sld>
-</file>
-
-<file path=ppt/slides/slide33.xml><?xml version="1.0" encoding="utf-8"?>
-<p:sld xmlns:a="http://schemas.openxmlformats.org/drawingml/2006/main" xmlns:r="http://schemas.openxmlformats.org/officeDocument/2006/relationships" xmlns:p="http://schemas.openxmlformats.org/presentationml/2006/main">
-  <p:cSld>
-    <p:spTree>
-      <p:nvGrpSpPr>
-        <p:cNvPr id="1" name=""/>
-        <p:cNvGrpSpPr/>
-        <p:nvPr/>
-      </p:nvGrpSpPr>
-      <p:grpSpPr>
-        <a:xfrm>
-          <a:off x="0" y="0"/>
-          <a:ext cx="0" cy="0"/>
-          <a:chOff x="0" y="0"/>
-          <a:chExt cx="0" cy="0"/>
-        </a:xfrm>
-      </p:grpSpPr>
-      <p:sp>
-        <p:nvSpPr>
-          <p:cNvPr id="4" name="Title 3"/>
-          <p:cNvSpPr>
-            <a:spLocks noGrp="1"/>
-          </p:cNvSpPr>
-          <p:nvPr>
-            <p:ph type="title"/>
-          </p:nvPr>
-        </p:nvSpPr>
-        <p:spPr/>
-        <p:txBody>
-          <a:bodyPr/>
-          <a:lstStyle/>
-          <a:p>
-            <a:r>
-              <a:rPr lang="en-US" dirty="0" smtClean="0"/>
-              <a:t>Homework</a:t>
-            </a:r>
-            <a:endParaRPr lang="en-US" dirty="0"/>
-          </a:p>
-        </p:txBody>
-      </p:sp>
-      <p:sp>
-        <p:nvSpPr>
-          <p:cNvPr id="5" name="Content Placeholder 4"/>
-          <p:cNvSpPr>
-            <a:spLocks noGrp="1"/>
-          </p:cNvSpPr>
-          <p:nvPr>
-            <p:ph idx="1"/>
-          </p:nvPr>
-        </p:nvSpPr>
-        <p:spPr/>
-        <p:txBody>
-          <a:bodyPr/>
-          <a:lstStyle/>
-          <a:p>
-            <a:pPr marL="400050" indent="-400050">
-              <a:lnSpc>
-                <a:spcPct val="100000"/>
-              </a:lnSpc>
-              <a:buFont typeface="+mj-lt"/>
-              <a:buAutoNum type="arabicPeriod"/>
-            </a:pPr>
-            <a:r>
-              <a:rPr lang="en-US" sz="3000" dirty="0" smtClean="0"/>
-              <a:t>Create a simple web site for buying mobile devices</a:t>
-            </a:r>
-          </a:p>
-          <a:p>
-            <a:pPr marL="804863" lvl="1" indent="-457200">
-              <a:lnSpc>
-                <a:spcPct val="100000"/>
-              </a:lnSpc>
-            </a:pPr>
-            <a:r>
-              <a:rPr lang="en-US" sz="2600" dirty="0" smtClean="0"/>
-              <a:t>Create the following pages and put them into </a:t>
-            </a:r>
-            <a:r>
-              <a:rPr lang="en-US" sz="2600" dirty="0" err="1" smtClean="0"/>
-              <a:t>nav</a:t>
-            </a:r>
-            <a:endParaRPr lang="en-US" sz="2600" dirty="0" smtClean="0"/>
-          </a:p>
-          <a:p>
-            <a:pPr marL="968375" lvl="2" indent="-328613">
-              <a:lnSpc>
-                <a:spcPct val="100000"/>
-              </a:lnSpc>
-            </a:pPr>
-            <a:r>
-              <a:rPr lang="en-US" sz="2400" dirty="0" smtClean="0"/>
-              <a:t>Home -&gt; contains greeting and site information</a:t>
-            </a:r>
-            <a:endParaRPr lang="en-US" sz="2400" dirty="0"/>
-          </a:p>
-          <a:p>
-            <a:pPr marL="968375" lvl="2" indent="-328613">
-              <a:lnSpc>
-                <a:spcPct val="100000"/>
-              </a:lnSpc>
-            </a:pPr>
-            <a:r>
-              <a:rPr lang="en-US" sz="2400" dirty="0" smtClean="0"/>
-              <a:t>Smart phones -&gt; contains a list of smartphones</a:t>
-            </a:r>
-          </a:p>
-          <a:p>
-            <a:pPr marL="968375" lvl="2" indent="-328613">
-              <a:lnSpc>
-                <a:spcPct val="100000"/>
-              </a:lnSpc>
-            </a:pPr>
-            <a:r>
-              <a:rPr lang="en-US" sz="2400" dirty="0" smtClean="0"/>
-              <a:t>Tablets -&gt; contains a list of tablets</a:t>
-            </a:r>
-          </a:p>
-          <a:p>
-            <a:pPr marL="968375" lvl="2" indent="-328613">
-              <a:lnSpc>
-                <a:spcPct val="100000"/>
-              </a:lnSpc>
-            </a:pPr>
-            <a:r>
-              <a:rPr lang="en-US" sz="2400" dirty="0" err="1" smtClean="0"/>
-              <a:t>Wearables</a:t>
-            </a:r>
-            <a:r>
-              <a:rPr lang="en-US" sz="2400" dirty="0" smtClean="0"/>
-              <a:t> -&gt; contains a list </a:t>
-            </a:r>
-            <a:r>
-              <a:rPr lang="en-US" sz="2400" dirty="0"/>
-              <a:t>of </a:t>
-            </a:r>
-            <a:r>
-              <a:rPr lang="en-US" sz="2400" dirty="0" err="1" smtClean="0"/>
-              <a:t>wearables</a:t>
-            </a:r>
-            <a:endParaRPr lang="en-US" sz="2400" dirty="0"/>
-          </a:p>
-          <a:p>
-            <a:pPr marL="676275" lvl="1" indent="-328613">
-              <a:lnSpc>
-                <a:spcPct val="100000"/>
-              </a:lnSpc>
-            </a:pPr>
-            <a:r>
-              <a:rPr lang="en-US" sz="2600" dirty="0" smtClean="0"/>
-              <a:t>All pages must have the same header, navigation and footer</a:t>
-            </a:r>
-          </a:p>
-          <a:p>
-            <a:pPr marL="676275" lvl="1" indent="-328613">
-              <a:lnSpc>
-                <a:spcPct val="100000"/>
-              </a:lnSpc>
-            </a:pPr>
-            <a:r>
-              <a:rPr lang="en-US" sz="2600" dirty="0" smtClean="0"/>
-              <a:t>Use Jade and Jade Layouts</a:t>
-            </a:r>
-          </a:p>
-          <a:p>
-            <a:pPr marL="676275" lvl="1" indent="-328613">
-              <a:lnSpc>
-                <a:spcPct val="100000"/>
-              </a:lnSpc>
-            </a:pPr>
-            <a:r>
-              <a:rPr lang="en-US" sz="2600" dirty="0" smtClean="0"/>
-              <a:t>Use the </a:t>
-            </a:r>
-            <a:r>
-              <a:rPr lang="en-US" sz="2600" dirty="0" smtClean="0">
-                <a:solidFill>
-                  <a:schemeClr val="accent5">
-                    <a:lumMod val="20000"/>
-                    <a:lumOff val="80000"/>
-                  </a:schemeClr>
-                </a:solidFill>
-                <a:latin typeface="Consolas" panose="020B0609020204030204" pitchFamily="49" charset="0"/>
-                <a:cs typeface="Consolas" panose="020B0609020204030204" pitchFamily="49" charset="0"/>
-              </a:rPr>
-              <a:t>each</a:t>
-            </a:r>
-            <a:r>
-              <a:rPr lang="en-US" sz="2600" dirty="0" smtClean="0"/>
-              <a:t> directive to create the navigation</a:t>
-            </a:r>
-          </a:p>
-        </p:txBody>
-      </p:sp>
-    </p:spTree>
-    <p:extLst>
-      <p:ext uri="{BB962C8B-B14F-4D97-AF65-F5344CB8AC3E}">
-        <p14:creationId xmlns:p14="http://schemas.microsoft.com/office/powerpoint/2010/main" val="1096374817"/>
-      </p:ext>
-    </p:extLst>
-  </p:cSld>
-  <p:clrMapOvr>
-    <a:masterClrMapping/>
-  </p:clrMapOvr>
 </p:sld>
 </file>
 

</xml_diff>